<commit_message>
eth umsetzung bald fertig
</commit_message>
<xml_diff>
--- a/Thesis/Documents/images.pptx
+++ b/Thesis/Documents/images.pptx
@@ -22,6 +22,7 @@
     <p:sldId id="273" r:id="rId16"/>
     <p:sldId id="274" r:id="rId17"/>
     <p:sldId id="275" r:id="rId18"/>
+    <p:sldId id="276" r:id="rId19"/>
   </p:sldIdLst>
   <p:sldSz cx="12192000" cy="6858000"/>
   <p:notesSz cx="6858000" cy="9144000"/>
@@ -292,7 +293,7 @@
           <a:p>
             <a:fld id="{F3D68A99-DBEC-4D84-A6F7-2919502EAE48}" type="datetimeFigureOut">
               <a:rPr lang="en-US" smtClean="0"/>
-              <a:t>3/15/2018</a:t>
+              <a:t>3/17/2018</a:t>
             </a:fld>
             <a:endParaRPr lang="en-US"/>
           </a:p>
@@ -492,7 +493,7 @@
           <a:p>
             <a:fld id="{F3D68A99-DBEC-4D84-A6F7-2919502EAE48}" type="datetimeFigureOut">
               <a:rPr lang="en-US" smtClean="0"/>
-              <a:t>3/15/2018</a:t>
+              <a:t>3/17/2018</a:t>
             </a:fld>
             <a:endParaRPr lang="en-US"/>
           </a:p>
@@ -702,7 +703,7 @@
           <a:p>
             <a:fld id="{F3D68A99-DBEC-4D84-A6F7-2919502EAE48}" type="datetimeFigureOut">
               <a:rPr lang="en-US" smtClean="0"/>
-              <a:t>3/15/2018</a:t>
+              <a:t>3/17/2018</a:t>
             </a:fld>
             <a:endParaRPr lang="en-US"/>
           </a:p>
@@ -902,7 +903,7 @@
           <a:p>
             <a:fld id="{F3D68A99-DBEC-4D84-A6F7-2919502EAE48}" type="datetimeFigureOut">
               <a:rPr lang="en-US" smtClean="0"/>
-              <a:t>3/15/2018</a:t>
+              <a:t>3/17/2018</a:t>
             </a:fld>
             <a:endParaRPr lang="en-US"/>
           </a:p>
@@ -1178,7 +1179,7 @@
           <a:p>
             <a:fld id="{F3D68A99-DBEC-4D84-A6F7-2919502EAE48}" type="datetimeFigureOut">
               <a:rPr lang="en-US" smtClean="0"/>
-              <a:t>3/15/2018</a:t>
+              <a:t>3/17/2018</a:t>
             </a:fld>
             <a:endParaRPr lang="en-US"/>
           </a:p>
@@ -1446,7 +1447,7 @@
           <a:p>
             <a:fld id="{F3D68A99-DBEC-4D84-A6F7-2919502EAE48}" type="datetimeFigureOut">
               <a:rPr lang="en-US" smtClean="0"/>
-              <a:t>3/15/2018</a:t>
+              <a:t>3/17/2018</a:t>
             </a:fld>
             <a:endParaRPr lang="en-US"/>
           </a:p>
@@ -1861,7 +1862,7 @@
           <a:p>
             <a:fld id="{F3D68A99-DBEC-4D84-A6F7-2919502EAE48}" type="datetimeFigureOut">
               <a:rPr lang="en-US" smtClean="0"/>
-              <a:t>3/15/2018</a:t>
+              <a:t>3/17/2018</a:t>
             </a:fld>
             <a:endParaRPr lang="en-US"/>
           </a:p>
@@ -2003,7 +2004,7 @@
           <a:p>
             <a:fld id="{F3D68A99-DBEC-4D84-A6F7-2919502EAE48}" type="datetimeFigureOut">
               <a:rPr lang="en-US" smtClean="0"/>
-              <a:t>3/15/2018</a:t>
+              <a:t>3/17/2018</a:t>
             </a:fld>
             <a:endParaRPr lang="en-US"/>
           </a:p>
@@ -2116,7 +2117,7 @@
           <a:p>
             <a:fld id="{F3D68A99-DBEC-4D84-A6F7-2919502EAE48}" type="datetimeFigureOut">
               <a:rPr lang="en-US" smtClean="0"/>
-              <a:t>3/15/2018</a:t>
+              <a:t>3/17/2018</a:t>
             </a:fld>
             <a:endParaRPr lang="en-US"/>
           </a:p>
@@ -2429,7 +2430,7 @@
           <a:p>
             <a:fld id="{F3D68A99-DBEC-4D84-A6F7-2919502EAE48}" type="datetimeFigureOut">
               <a:rPr lang="en-US" smtClean="0"/>
-              <a:t>3/15/2018</a:t>
+              <a:t>3/17/2018</a:t>
             </a:fld>
             <a:endParaRPr lang="en-US"/>
           </a:p>
@@ -2718,7 +2719,7 @@
           <a:p>
             <a:fld id="{F3D68A99-DBEC-4D84-A6F7-2919502EAE48}" type="datetimeFigureOut">
               <a:rPr lang="en-US" smtClean="0"/>
-              <a:t>3/15/2018</a:t>
+              <a:t>3/17/2018</a:t>
             </a:fld>
             <a:endParaRPr lang="en-US"/>
           </a:p>
@@ -2961,7 +2962,7 @@
           <a:p>
             <a:fld id="{F3D68A99-DBEC-4D84-A6F7-2919502EAE48}" type="datetimeFigureOut">
               <a:rPr lang="en-US" smtClean="0"/>
-              <a:t>3/15/2018</a:t>
+              <a:t>3/17/2018</a:t>
             </a:fld>
             <a:endParaRPr lang="en-US"/>
           </a:p>
@@ -17161,6 +17162,36 @@
 </p:sld>
 </file>
 
+<file path=ppt/slides/slide18.xml><?xml version="1.0" encoding="utf-8"?>
+<p:sld xmlns:a="http://schemas.openxmlformats.org/drawingml/2006/main" xmlns:r="http://schemas.openxmlformats.org/officeDocument/2006/relationships" xmlns:p="http://schemas.openxmlformats.org/presentationml/2006/main">
+  <p:cSld>
+    <p:spTree>
+      <p:nvGrpSpPr>
+        <p:cNvPr id="1" name=""/>
+        <p:cNvGrpSpPr/>
+        <p:nvPr/>
+      </p:nvGrpSpPr>
+      <p:grpSpPr>
+        <a:xfrm>
+          <a:off x="0" y="0"/>
+          <a:ext cx="0" cy="0"/>
+          <a:chOff x="0" y="0"/>
+          <a:chExt cx="0" cy="0"/>
+        </a:xfrm>
+      </p:grpSpPr>
+    </p:spTree>
+    <p:extLst>
+      <p:ext uri="{BB962C8B-B14F-4D97-AF65-F5344CB8AC3E}">
+        <p14:creationId xmlns:p14="http://schemas.microsoft.com/office/powerpoint/2010/main" val="3493126842"/>
+      </p:ext>
+    </p:extLst>
+  </p:cSld>
+  <p:clrMapOvr>
+    <a:masterClrMapping/>
+  </p:clrMapOvr>
+</p:sld>
+</file>
+
 <file path=ppt/slides/slide2.xml><?xml version="1.0" encoding="utf-8"?>
 <p:sld xmlns:a="http://schemas.openxmlformats.org/drawingml/2006/main" xmlns:r="http://schemas.openxmlformats.org/officeDocument/2006/relationships" xmlns:p="http://schemas.openxmlformats.org/presentationml/2006/main">
   <p:cSld>

</xml_diff>